<commit_message>
update pptx to slide3
</commit_message>
<xml_diff>
--- a/Presentation.pptx
+++ b/Presentation.pptx
@@ -5,10 +5,10 @@
     <p:sldMasterId id="2147483648" r:id="rId1"/>
   </p:sldMasterIdLst>
   <p:notesMasterIdLst>
-    <p:notesMasterId r:id="rId11"/>
+    <p:notesMasterId r:id="rId12"/>
   </p:notesMasterIdLst>
   <p:handoutMasterIdLst>
-    <p:handoutMasterId r:id="rId12"/>
+    <p:handoutMasterId r:id="rId13"/>
   </p:handoutMasterIdLst>
   <p:sldIdLst>
     <p:sldId id="257" r:id="rId3"/>
@@ -16,9 +16,10 @@
     <p:sldId id="258" r:id="rId5"/>
     <p:sldId id="264" r:id="rId6"/>
     <p:sldId id="265" r:id="rId7"/>
-    <p:sldId id="260" r:id="rId8"/>
-    <p:sldId id="263" r:id="rId9"/>
-    <p:sldId id="259" r:id="rId10"/>
+    <p:sldId id="266" r:id="rId8"/>
+    <p:sldId id="260" r:id="rId9"/>
+    <p:sldId id="263" r:id="rId10"/>
+    <p:sldId id="259" r:id="rId11"/>
   </p:sldIdLst>
   <p:sldSz cx="12192000" cy="6858000"/>
   <p:notesSz cx="7103745" cy="10234295"/>
@@ -3502,7 +3503,7 @@
         </p:nvPicPr>
         <p:blipFill>
           <a:blip r:embed="rId1">
-            <a:lum bright="-36000"/>
+            <a:lum bright="-48000"/>
           </a:blip>
           <a:stretch>
             <a:fillRect/>
@@ -3567,7 +3568,7 @@
                 </a:srgbClr>
               </a:clrTo>
             </a:clrChange>
-            <a:lum bright="-78000" contrast="-66000"/>
+            <a:lum bright="-84000" contrast="-66000"/>
           </a:blip>
           <a:stretch>
             <a:fillRect/>
@@ -3575,8 +3576,8 @@
         </p:blipFill>
         <p:spPr>
           <a:xfrm>
-            <a:off x="165100" y="25400"/>
-            <a:ext cx="11948160" cy="6807200"/>
+            <a:off x="77470" y="25400"/>
+            <a:ext cx="12037695" cy="6807200"/>
           </a:xfrm>
           <a:prstGeom prst="rect">
             <a:avLst/>
@@ -3667,7 +3668,7 @@
         </p:nvPicPr>
         <p:blipFill>
           <a:blip r:embed="rId1">
-            <a:lum bright="-24000"/>
+            <a:lum bright="-42000"/>
           </a:blip>
           <a:stretch>
             <a:fillRect/>
@@ -3676,7 +3677,7 @@
         <p:spPr>
           <a:xfrm>
             <a:off x="4445" y="25400"/>
-            <a:ext cx="4335145" cy="6503670"/>
+            <a:ext cx="4514215" cy="6503670"/>
           </a:xfrm>
           <a:prstGeom prst="rect">
             <a:avLst/>
@@ -3726,9 +3727,126 @@
                 <a:latin typeface="Fira Code" panose="020B0609050000020004" charset="0"/>
                 <a:cs typeface="Fira Code" panose="020B0609050000020004" charset="0"/>
               </a:rPr>
-              <a:t>by  Brian and Da Vince</a:t>
-            </a:r>
-            <a:endParaRPr lang="x-none" altLang="en-US" i="1">
+              <a:t>by  </a:t>
+            </a:r>
+            <a:r>
+              <a:rPr lang="x-none" altLang="en-US" i="1" u="sng">
+                <a:solidFill>
+                  <a:schemeClr val="accent6">
+                    <a:lumMod val="40000"/>
+                    <a:lumOff val="60000"/>
+                  </a:schemeClr>
+                </a:solidFill>
+                <a:latin typeface="Fira Code" panose="020B0609050000020004" charset="0"/>
+                <a:cs typeface="Fira Code" panose="020B0609050000020004" charset="0"/>
+              </a:rPr>
+              <a:t>Brian</a:t>
+            </a:r>
+            <a:r>
+              <a:rPr lang="x-none" altLang="en-US" i="1">
+                <a:solidFill>
+                  <a:schemeClr val="accent6">
+                    <a:lumMod val="40000"/>
+                    <a:lumOff val="60000"/>
+                  </a:schemeClr>
+                </a:solidFill>
+                <a:latin typeface="Fira Code" panose="020B0609050000020004" charset="0"/>
+                <a:cs typeface="Fira Code" panose="020B0609050000020004" charset="0"/>
+              </a:rPr>
+              <a:t> </a:t>
+            </a:r>
+            <a:r>
+              <a:rPr lang="x-none" altLang="en-US" i="1" u="sng">
+                <a:solidFill>
+                  <a:schemeClr val="accent6">
+                    <a:lumMod val="40000"/>
+                    <a:lumOff val="60000"/>
+                  </a:schemeClr>
+                </a:solidFill>
+                <a:latin typeface="Fira Code" panose="020B0609050000020004" charset="0"/>
+                <a:cs typeface="Fira Code" panose="020B0609050000020004" charset="0"/>
+              </a:rPr>
+              <a:t>Pondi</a:t>
+            </a:r>
+            <a:r>
+              <a:rPr lang="x-none" altLang="en-US" i="1">
+                <a:solidFill>
+                  <a:schemeClr val="accent6">
+                    <a:lumMod val="40000"/>
+                    <a:lumOff val="60000"/>
+                  </a:schemeClr>
+                </a:solidFill>
+                <a:latin typeface="Fira Code" panose="020B0609050000020004" charset="0"/>
+                <a:cs typeface="Fira Code" panose="020B0609050000020004" charset="0"/>
+              </a:rPr>
+              <a:t> </a:t>
+            </a:r>
+            <a:r>
+              <a:rPr lang="x-none" altLang="en-US" i="1" u="sng">
+                <a:solidFill>
+                  <a:schemeClr val="accent6">
+                    <a:lumMod val="40000"/>
+                    <a:lumOff val="60000"/>
+                  </a:schemeClr>
+                </a:solidFill>
+                <a:latin typeface="Fira Code" panose="020B0609050000020004" charset="0"/>
+                <a:cs typeface="Fira Code" panose="020B0609050000020004" charset="0"/>
+              </a:rPr>
+              <a:t>and</a:t>
+            </a:r>
+            <a:r>
+              <a:rPr lang="x-none" altLang="en-US" i="1">
+                <a:solidFill>
+                  <a:schemeClr val="accent6">
+                    <a:lumMod val="40000"/>
+                    <a:lumOff val="60000"/>
+                  </a:schemeClr>
+                </a:solidFill>
+                <a:latin typeface="Fira Code" panose="020B0609050000020004" charset="0"/>
+                <a:cs typeface="Fira Code" panose="020B0609050000020004" charset="0"/>
+              </a:rPr>
+              <a:t> </a:t>
+            </a:r>
+            <a:r>
+              <a:rPr lang="x-none" altLang="en-US" i="1" u="sng">
+                <a:solidFill>
+                  <a:schemeClr val="accent6">
+                    <a:lumMod val="40000"/>
+                    <a:lumOff val="60000"/>
+                  </a:schemeClr>
+                </a:solidFill>
+                <a:latin typeface="Fira Code" panose="020B0609050000020004" charset="0"/>
+                <a:cs typeface="Fira Code" panose="020B0609050000020004" charset="0"/>
+              </a:rPr>
+              <a:t>Da</a:t>
+            </a:r>
+            <a:r>
+              <a:rPr lang="x-none" altLang="en-US" i="1">
+                <a:solidFill>
+                  <a:schemeClr val="accent6">
+                    <a:lumMod val="40000"/>
+                    <a:lumOff val="60000"/>
+                  </a:schemeClr>
+                </a:solidFill>
+                <a:latin typeface="Fira Code" panose="020B0609050000020004" charset="0"/>
+                <a:cs typeface="Fira Code" panose="020B0609050000020004" charset="0"/>
+              </a:rPr>
+              <a:t> </a:t>
+            </a:r>
+            <a:r>
+              <a:rPr lang="x-none" altLang="en-US" i="1" u="sng">
+                <a:solidFill>
+                  <a:schemeClr val="accent6">
+                    <a:lumMod val="40000"/>
+                    <a:lumOff val="60000"/>
+                  </a:schemeClr>
+                </a:solidFill>
+                <a:latin typeface="Fira Code" panose="020B0609050000020004" charset="0"/>
+                <a:cs typeface="Fira Code" panose="020B0609050000020004" charset="0"/>
+              </a:rPr>
+              <a:t>Vince</a:t>
+            </a:r>
+            <a:endParaRPr lang="x-none" altLang="en-US" i="1" u="sng">
               <a:solidFill>
                 <a:schemeClr val="accent6">
                   <a:lumMod val="40000"/>
@@ -3974,7 +4092,31 @@
                 <a:latin typeface="Fira Code" panose="020B0609050000020004" charset="0"/>
                 <a:cs typeface="Fira Code" panose="020B0609050000020004" charset="0"/>
               </a:rPr>
-              <a:t>Da Vince Koyo:</a:t>
+              <a:t>Da Vince Koyo(</a:t>
+            </a:r>
+            <a:r>
+              <a:rPr lang="x-none" altLang="en-US">
+                <a:solidFill>
+                  <a:srgbClr val="92D050"/>
+                </a:solidFill>
+                <a:latin typeface="Fira Code" panose="020B0609050000020004" charset="0"/>
+                <a:cs typeface="Fira Code" panose="020B0609050000020004" charset="0"/>
+                <a:sym typeface="+mn-ea"/>
+              </a:rPr>
+              <a:t>@koyo_jakanees</a:t>
+            </a:r>
+            <a:r>
+              <a:rPr lang="x-none" altLang="en-US" b="1" u="sng">
+                <a:solidFill>
+                  <a:schemeClr val="accent6">
+                    <a:lumMod val="40000"/>
+                    <a:lumOff val="60000"/>
+                  </a:schemeClr>
+                </a:solidFill>
+                <a:latin typeface="Fira Code" panose="020B0609050000020004" charset="0"/>
+                <a:cs typeface="Fira Code" panose="020B0609050000020004" charset="0"/>
+              </a:rPr>
+              <a:t>)</a:t>
             </a:r>
             <a:endParaRPr lang="x-none" altLang="en-US" sz="1800">
               <a:solidFill>
@@ -4095,7 +4237,7 @@
                 <a:latin typeface="Fira Code" panose="020B0609050000020004" charset="0"/>
                 <a:cs typeface="Fira Code" panose="020B0609050000020004" charset="0"/>
               </a:rPr>
-              <a:t>Consulting and studying</a:t>
+              <a:t>Consulting, VGI and studying</a:t>
             </a:r>
             <a:endParaRPr lang="x-none" altLang="en-US" sz="1800" i="1">
               <a:solidFill>
@@ -4141,6 +4283,18 @@
               </a:rPr>
               <a:t> </a:t>
             </a:r>
+            <a:endParaRPr lang="x-none" altLang="en-US" sz="1800" i="1">
+              <a:solidFill>
+                <a:schemeClr val="accent6">
+                  <a:lumMod val="75000"/>
+                </a:schemeClr>
+              </a:solidFill>
+            </a:endParaRPr>
+          </a:p>
+          <a:p>
+            <a:pPr marL="0" indent="0">
+              <a:buNone/>
+            </a:pPr>
             <a:endParaRPr lang="x-none" altLang="en-US" sz="1800" i="1">
               <a:solidFill>
                 <a:schemeClr val="accent6">
@@ -4405,7 +4559,18 @@
                 <a:cs typeface="Fira Code" panose="020B0609050000020004" charset="0"/>
                 <a:sym typeface="+mn-ea"/>
               </a:rPr>
-              <a:t>Geospatial Data Abstraction Library</a:t>
+              <a:t>Geospatial Data Abstraction Library </a:t>
+            </a:r>
+            <a:r>
+              <a:rPr lang="x-none" altLang="en-US" sz="1600" i="1">
+                <a:solidFill>
+                  <a:srgbClr val="1B2910"/>
+                </a:solidFill>
+                <a:latin typeface="Fira Code" panose="020B0609050000020004" charset="0"/>
+                <a:cs typeface="Fira Code" panose="020B0609050000020004" charset="0"/>
+                <a:sym typeface="+mn-ea"/>
+              </a:rPr>
+              <a:t>[released in 1984]</a:t>
             </a:r>
             <a:endParaRPr lang="x-none" altLang="en-US" sz="1600">
               <a:solidFill>
@@ -4440,9 +4605,129 @@
                 <a:cs typeface="Fira Code" panose="020B0609050000020004" charset="0"/>
                 <a:sym typeface="+mn-ea"/>
               </a:rPr>
-              <a:t>Geographic Resource Analysis Support System</a:t>
+              <a:t>Geographic Resource Analysis Support System </a:t>
+            </a:r>
+            <a:r>
+              <a:rPr lang="x-none" altLang="en-US" sz="1600" i="1">
+                <a:solidFill>
+                  <a:srgbClr val="1B2910"/>
+                </a:solidFill>
+                <a:latin typeface="Fira Code" panose="020B0609050000020004" charset="0"/>
+                <a:cs typeface="Fira Code" panose="020B0609050000020004" charset="0"/>
+                <a:sym typeface="+mn-ea"/>
+              </a:rPr>
+              <a:t>[released in 1998]</a:t>
             </a:r>
             <a:endParaRPr lang="x-none" altLang="en-US" sz="1600" i="1">
+              <a:solidFill>
+                <a:schemeClr val="accent6">
+                  <a:lumMod val="50000"/>
+                </a:schemeClr>
+              </a:solidFill>
+              <a:latin typeface="Fira Code" panose="020B0609050000020004" charset="0"/>
+              <a:cs typeface="Fira Code" panose="020B0609050000020004" charset="0"/>
+              <a:sym typeface="+mn-ea"/>
+            </a:endParaRPr>
+          </a:p>
+          <a:p>
+            <a:pPr marL="0" indent="0">
+              <a:buNone/>
+            </a:pPr>
+            <a:r>
+              <a:rPr lang="x-none" altLang="en-US" sz="1800" b="1">
+                <a:solidFill>
+                  <a:srgbClr val="92D050"/>
+                </a:solidFill>
+                <a:latin typeface="Fira Code" panose="020B0609050000020004" charset="0"/>
+                <a:cs typeface="Fira Code" panose="020B0609050000020004" charset="0"/>
+                <a:sym typeface="+mn-ea"/>
+              </a:rPr>
+              <a:t>        &gt;&gt; OGR:</a:t>
+            </a:r>
+            <a:r>
+              <a:rPr lang="x-none" altLang="en-US" sz="1800" i="1">
+                <a:solidFill>
+                  <a:schemeClr val="accent6">
+                    <a:lumMod val="75000"/>
+                  </a:schemeClr>
+                </a:solidFill>
+                <a:latin typeface="Fira Code" panose="020B0609050000020004" charset="0"/>
+                <a:cs typeface="Fira Code" panose="020B0609050000020004" charset="0"/>
+                <a:sym typeface="+mn-ea"/>
+              </a:rPr>
+              <a:t> </a:t>
+            </a:r>
+            <a:r>
+              <a:rPr lang="x-none" altLang="en-US" sz="1600" i="1">
+                <a:solidFill>
+                  <a:schemeClr val="accent6">
+                    <a:lumMod val="75000"/>
+                  </a:schemeClr>
+                </a:solidFill>
+                <a:latin typeface="Fira Code" panose="020B0609050000020004" charset="0"/>
+                <a:cs typeface="Fira Code" panose="020B0609050000020004" charset="0"/>
+                <a:sym typeface="+mn-ea"/>
+              </a:rPr>
+              <a:t>OGR Simple Feature Library, comes with GDAL </a:t>
+            </a:r>
+            <a:r>
+              <a:rPr lang="x-none" altLang="en-US" sz="1600" i="1">
+                <a:solidFill>
+                  <a:srgbClr val="1B2910"/>
+                </a:solidFill>
+                <a:latin typeface="Fira Code" panose="020B0609050000020004" charset="0"/>
+                <a:cs typeface="Fira Code" panose="020B0609050000020004" charset="0"/>
+                <a:sym typeface="+mn-ea"/>
+              </a:rPr>
+              <a:t>(OpenGIS Simple Feature Reference Implementation)</a:t>
+            </a:r>
+            <a:endParaRPr lang="x-none" altLang="en-US" sz="1600">
+              <a:solidFill>
+                <a:srgbClr val="1B2910"/>
+              </a:solidFill>
+              <a:latin typeface="Fira Code" panose="020B0609050000020004" charset="0"/>
+              <a:cs typeface="Fira Code" panose="020B0609050000020004" charset="0"/>
+            </a:endParaRPr>
+          </a:p>
+          <a:p>
+            <a:pPr marL="0" indent="0">
+              <a:buNone/>
+            </a:pPr>
+            <a:r>
+              <a:rPr lang="x-none" altLang="en-US" sz="1600">
+                <a:solidFill>
+                  <a:schemeClr val="accent6">
+                    <a:lumMod val="50000"/>
+                  </a:schemeClr>
+                </a:solidFill>
+                <a:latin typeface="Fira Code" panose="020B0609050000020004" charset="0"/>
+                <a:cs typeface="Fira Code" panose="020B0609050000020004" charset="0"/>
+              </a:rPr>
+              <a:t>    &gt; </a:t>
+            </a:r>
+            <a:r>
+              <a:rPr lang="x-none" altLang="en-US" sz="1600">
+                <a:solidFill>
+                  <a:schemeClr val="accent6">
+                    <a:lumMod val="75000"/>
+                  </a:schemeClr>
+                </a:solidFill>
+                <a:latin typeface="Fira Code" panose="020B0609050000020004" charset="0"/>
+                <a:cs typeface="Fira Code" panose="020B0609050000020004" charset="0"/>
+              </a:rPr>
+              <a:t>Both GDAL and GRASS GIS are member/projects under the Open Source Geospatial Foundation</a:t>
+            </a:r>
+            <a:r>
+              <a:rPr lang="x-none" altLang="en-US" sz="1600">
+                <a:solidFill>
+                  <a:srgbClr val="92D050"/>
+                </a:solidFill>
+                <a:latin typeface="Fira Code" panose="020B0609050000020004" charset="0"/>
+                <a:cs typeface="Fira Code" panose="020B0609050000020004" charset="0"/>
+              </a:rPr>
+              <a:t>(OSGeo)</a:t>
+            </a:r>
+            <a:endParaRPr lang="x-none" altLang="en-US" sz="1600">
               <a:solidFill>
                 <a:schemeClr val="accent6">
                   <a:lumMod val="75000"/>
@@ -4450,7 +4735,6 @@
               </a:solidFill>
               <a:latin typeface="Fira Code" panose="020B0609050000020004" charset="0"/>
               <a:cs typeface="Fira Code" panose="020B0609050000020004" charset="0"/>
-              <a:sym typeface="+mn-ea"/>
             </a:endParaRPr>
           </a:p>
           <a:p>
@@ -4458,18 +4742,77 @@
               <a:buNone/>
             </a:pPr>
             <a:r>
-              <a:rPr lang="x-none" altLang="en-US" sz="1800" b="1">
+              <a:rPr lang="x-none" altLang="en-US" sz="1400">
+                <a:solidFill>
+                  <a:schemeClr val="accent6">
+                    <a:lumMod val="50000"/>
+                  </a:schemeClr>
+                </a:solidFill>
+                <a:latin typeface="Fira Code" panose="020B0609050000020004" charset="0"/>
+                <a:cs typeface="Fira Code" panose="020B0609050000020004" charset="0"/>
+              </a:rPr>
+              <a:t>     &gt; </a:t>
+            </a:r>
+            <a:r>
+              <a:rPr lang="x-none" altLang="en-US" sz="1400">
+                <a:solidFill>
+                  <a:schemeClr val="accent6">
+                    <a:lumMod val="75000"/>
+                  </a:schemeClr>
+                </a:solidFill>
+                <a:latin typeface="Fira Code" panose="020B0609050000020004" charset="0"/>
+                <a:cs typeface="Fira Code" panose="020B0609050000020004" charset="0"/>
+              </a:rPr>
+              <a:t>Free and open source cross-platform and runs on major operating systems </a:t>
+            </a:r>
+            <a:r>
+              <a:rPr lang="x-none" altLang="en-US" sz="1600">
+                <a:solidFill>
+                  <a:schemeClr val="accent6">
+                    <a:lumMod val="75000"/>
+                  </a:schemeClr>
+                </a:solidFill>
+                <a:latin typeface="Fira Code" panose="020B0609050000020004" charset="0"/>
+                <a:cs typeface="Fira Code" panose="020B0609050000020004" charset="0"/>
+              </a:rPr>
+              <a:t>written in</a:t>
+            </a:r>
+            <a:r>
+              <a:rPr lang="x-none" altLang="en-US" sz="1600">
+                <a:solidFill>
+                  <a:schemeClr val="accent6">
+                    <a:lumMod val="50000"/>
+                  </a:schemeClr>
+                </a:solidFill>
+                <a:latin typeface="Fira Code" panose="020B0609050000020004" charset="0"/>
+                <a:cs typeface="Fira Code" panose="020B0609050000020004" charset="0"/>
+              </a:rPr>
+              <a:t> </a:t>
+            </a:r>
+            <a:r>
+              <a:rPr lang="x-none" altLang="en-US" sz="1600">
                 <a:solidFill>
                   <a:srgbClr val="92D050"/>
                 </a:solidFill>
                 <a:latin typeface="Fira Code" panose="020B0609050000020004" charset="0"/>
                 <a:cs typeface="Fira Code" panose="020B0609050000020004" charset="0"/>
-                <a:sym typeface="+mn-ea"/>
-              </a:rPr>
-              <a:t>        &gt;&gt; OGR:</a:t>
-            </a:r>
-            <a:r>
-              <a:rPr lang="x-none" altLang="en-US" sz="1800" i="1">
+              </a:rPr>
+              <a:t>C, C++</a:t>
+            </a:r>
+            <a:r>
+              <a:rPr lang="x-none" altLang="en-US" sz="1600">
+                <a:solidFill>
+                  <a:schemeClr val="accent6">
+                    <a:lumMod val="50000"/>
+                  </a:schemeClr>
+                </a:solidFill>
+                <a:latin typeface="Fira Code" panose="020B0609050000020004" charset="0"/>
+                <a:cs typeface="Fira Code" panose="020B0609050000020004" charset="0"/>
+              </a:rPr>
+              <a:t> </a:t>
+            </a:r>
+            <a:r>
+              <a:rPr lang="x-none" altLang="en-US" sz="1600">
                 <a:solidFill>
                   <a:schemeClr val="accent6">
                     <a:lumMod val="75000"/>
@@ -4477,12 +4820,45 @@
                 </a:solidFill>
                 <a:latin typeface="Fira Code" panose="020B0609050000020004" charset="0"/>
                 <a:cs typeface="Fira Code" panose="020B0609050000020004" charset="0"/>
-                <a:sym typeface="+mn-ea"/>
+              </a:rPr>
+              <a:t>with      great</a:t>
+            </a:r>
+            <a:r>
+              <a:rPr lang="x-none" altLang="en-US" sz="1600">
+                <a:solidFill>
+                  <a:schemeClr val="accent6">
+                    <a:lumMod val="50000"/>
+                  </a:schemeClr>
+                </a:solidFill>
+                <a:latin typeface="Fira Code" panose="020B0609050000020004" charset="0"/>
+                <a:cs typeface="Fira Code" panose="020B0609050000020004" charset="0"/>
               </a:rPr>
               <a:t> </a:t>
             </a:r>
             <a:r>
-              <a:rPr lang="x-none" altLang="en-US" sz="1600" i="1">
+              <a:rPr lang="x-none" altLang="en-US" sz="1600">
+                <a:solidFill>
+                  <a:srgbClr val="92D050"/>
+                </a:solidFill>
+                <a:latin typeface="Fira Code" panose="020B0609050000020004" charset="0"/>
+                <a:cs typeface="Fira Code" panose="020B0609050000020004" charset="0"/>
+              </a:rPr>
+              <a:t>python</a:t>
+            </a:r>
+            <a:r>
+              <a:rPr lang="x-none" altLang="en-US" sz="1600">
+                <a:solidFill>
+                  <a:schemeClr val="accent6">
+                    <a:lumMod val="50000"/>
+                  </a:schemeClr>
+                </a:solidFill>
+                <a:latin typeface="Fira Code" panose="020B0609050000020004" charset="0"/>
+                <a:cs typeface="Fira Code" panose="020B0609050000020004" charset="0"/>
+              </a:rPr>
+              <a:t> </a:t>
+            </a:r>
+            <a:r>
+              <a:rPr lang="x-none" altLang="en-US" sz="1600">
                 <a:solidFill>
                   <a:schemeClr val="accent6">
                     <a:lumMod val="75000"/>
@@ -4490,22 +4866,8 @@
                 </a:solidFill>
                 <a:latin typeface="Fira Code" panose="020B0609050000020004" charset="0"/>
                 <a:cs typeface="Fira Code" panose="020B0609050000020004" charset="0"/>
-                <a:sym typeface="+mn-ea"/>
-              </a:rPr>
-              <a:t>OGR Simple Feature Library (</a:t>
-            </a:r>
-            <a:r>
-              <a:rPr lang="x-none" altLang="en-US" sz="1600" i="1">
-                <a:solidFill>
-                  <a:schemeClr val="accent6">
-                    <a:lumMod val="50000"/>
-                  </a:schemeClr>
-                </a:solidFill>
-                <a:latin typeface="Fira Code" panose="020B0609050000020004" charset="0"/>
-                <a:cs typeface="Fira Code" panose="020B0609050000020004" charset="0"/>
-                <a:sym typeface="+mn-ea"/>
-              </a:rPr>
-              <a:t>OpenGIS Simple Feature Reference Implementation)</a:t>
+              </a:rPr>
+              <a:t>api bindings and wrappers</a:t>
             </a:r>
             <a:endParaRPr lang="x-none" altLang="en-US" sz="1600">
               <a:solidFill>
@@ -4543,24 +4905,10 @@
                 <a:latin typeface="Fira Code" panose="020B0609050000020004" charset="0"/>
                 <a:cs typeface="Fira Code" panose="020B0609050000020004" charset="0"/>
               </a:rPr>
-              <a:t>Both GDAL and GRASS GIS are member/projects under the Open Source Geospatial Foundation</a:t>
-            </a:r>
-            <a:endParaRPr lang="x-none" altLang="en-US" sz="1600">
-              <a:solidFill>
-                <a:schemeClr val="accent6">
-                  <a:lumMod val="75000"/>
-                </a:schemeClr>
-              </a:solidFill>
-              <a:latin typeface="Fira Code" panose="020B0609050000020004" charset="0"/>
-              <a:cs typeface="Fira Code" panose="020B0609050000020004" charset="0"/>
-            </a:endParaRPr>
-          </a:p>
-          <a:p>
-            <a:pPr marL="0" indent="0">
-              <a:buNone/>
-            </a:pPr>
-            <a:r>
-              <a:rPr lang="x-none" altLang="en-US" sz="1400">
+              <a:t>Not as popular as QGIS and ArcGIS is with desktop users. Maybe cause they are more</a:t>
+            </a:r>
+            <a:r>
+              <a:rPr lang="x-none" altLang="en-US" sz="1600">
                 <a:solidFill>
                   <a:schemeClr val="accent6">
                     <a:lumMod val="50000"/>
@@ -4569,10 +4917,20 @@
                 <a:latin typeface="Fira Code" panose="020B0609050000020004" charset="0"/>
                 <a:cs typeface="Fira Code" panose="020B0609050000020004" charset="0"/>
               </a:rPr>
-              <a:t>     &gt; </a:t>
-            </a:r>
-            <a:r>
-              <a:rPr lang="x-none" altLang="en-US" sz="1400">
+              <a:t> </a:t>
+            </a:r>
+            <a:r>
+              <a:rPr lang="x-none" altLang="en-US" sz="1600">
+                <a:solidFill>
+                  <a:srgbClr val="92D050"/>
+                </a:solidFill>
+                <a:latin typeface="Fira Code" panose="020B0609050000020004" charset="0"/>
+                <a:cs typeface="Fira Code" panose="020B0609050000020004" charset="0"/>
+              </a:rPr>
+              <a:t>CLI </a:t>
+            </a:r>
+            <a:r>
+              <a:rPr lang="x-none" altLang="en-US" sz="1600">
                 <a:solidFill>
                   <a:schemeClr val="accent6">
                     <a:lumMod val="75000"/>
@@ -4581,183 +4939,7 @@
                 <a:latin typeface="Fira Code" panose="020B0609050000020004" charset="0"/>
                 <a:cs typeface="Fira Code" panose="020B0609050000020004" charset="0"/>
               </a:rPr>
-              <a:t>Free and open source cross-platform and runs on major operating systems </a:t>
-            </a:r>
-            <a:r>
-              <a:rPr lang="x-none" altLang="en-US" sz="1600">
-                <a:solidFill>
-                  <a:schemeClr val="accent6">
-                    <a:lumMod val="75000"/>
-                  </a:schemeClr>
-                </a:solidFill>
-                <a:latin typeface="Fira Code" panose="020B0609050000020004" charset="0"/>
-                <a:cs typeface="Fira Code" panose="020B0609050000020004" charset="0"/>
-              </a:rPr>
-              <a:t>written in</a:t>
-            </a:r>
-            <a:r>
-              <a:rPr lang="x-none" altLang="en-US" sz="1600">
-                <a:solidFill>
-                  <a:schemeClr val="accent6">
-                    <a:lumMod val="50000"/>
-                  </a:schemeClr>
-                </a:solidFill>
-                <a:latin typeface="Fira Code" panose="020B0609050000020004" charset="0"/>
-                <a:cs typeface="Fira Code" panose="020B0609050000020004" charset="0"/>
-              </a:rPr>
-              <a:t> </a:t>
-            </a:r>
-            <a:r>
-              <a:rPr lang="x-none" altLang="en-US" sz="1600">
-                <a:solidFill>
-                  <a:srgbClr val="92D050"/>
-                </a:solidFill>
-                <a:latin typeface="Fira Code" panose="020B0609050000020004" charset="0"/>
-                <a:cs typeface="Fira Code" panose="020B0609050000020004" charset="0"/>
-              </a:rPr>
-              <a:t>C, C++</a:t>
-            </a:r>
-            <a:r>
-              <a:rPr lang="x-none" altLang="en-US" sz="1600">
-                <a:solidFill>
-                  <a:schemeClr val="accent6">
-                    <a:lumMod val="50000"/>
-                  </a:schemeClr>
-                </a:solidFill>
-                <a:latin typeface="Fira Code" panose="020B0609050000020004" charset="0"/>
-                <a:cs typeface="Fira Code" panose="020B0609050000020004" charset="0"/>
-              </a:rPr>
-              <a:t> </a:t>
-            </a:r>
-            <a:r>
-              <a:rPr lang="x-none" altLang="en-US" sz="1600">
-                <a:solidFill>
-                  <a:schemeClr val="accent6">
-                    <a:lumMod val="75000"/>
-                  </a:schemeClr>
-                </a:solidFill>
-                <a:latin typeface="Fira Code" panose="020B0609050000020004" charset="0"/>
-                <a:cs typeface="Fira Code" panose="020B0609050000020004" charset="0"/>
-              </a:rPr>
-              <a:t>with      great</a:t>
-            </a:r>
-            <a:r>
-              <a:rPr lang="x-none" altLang="en-US" sz="1600">
-                <a:solidFill>
-                  <a:schemeClr val="accent6">
-                    <a:lumMod val="50000"/>
-                  </a:schemeClr>
-                </a:solidFill>
-                <a:latin typeface="Fira Code" panose="020B0609050000020004" charset="0"/>
-                <a:cs typeface="Fira Code" panose="020B0609050000020004" charset="0"/>
-              </a:rPr>
-              <a:t> </a:t>
-            </a:r>
-            <a:r>
-              <a:rPr lang="x-none" altLang="en-US" sz="1600">
-                <a:solidFill>
-                  <a:srgbClr val="92D050"/>
-                </a:solidFill>
-                <a:latin typeface="Fira Code" panose="020B0609050000020004" charset="0"/>
-                <a:cs typeface="Fira Code" panose="020B0609050000020004" charset="0"/>
-              </a:rPr>
-              <a:t>python</a:t>
-            </a:r>
-            <a:r>
-              <a:rPr lang="x-none" altLang="en-US" sz="1600">
-                <a:solidFill>
-                  <a:schemeClr val="accent6">
-                    <a:lumMod val="50000"/>
-                  </a:schemeClr>
-                </a:solidFill>
-                <a:latin typeface="Fira Code" panose="020B0609050000020004" charset="0"/>
-                <a:cs typeface="Fira Code" panose="020B0609050000020004" charset="0"/>
-              </a:rPr>
-              <a:t> </a:t>
-            </a:r>
-            <a:r>
-              <a:rPr lang="x-none" altLang="en-US" sz="1600">
-                <a:solidFill>
-                  <a:schemeClr val="accent6">
-                    <a:lumMod val="75000"/>
-                  </a:schemeClr>
-                </a:solidFill>
-                <a:latin typeface="Fira Code" panose="020B0609050000020004" charset="0"/>
-                <a:cs typeface="Fira Code" panose="020B0609050000020004" charset="0"/>
-              </a:rPr>
-              <a:t>api wrapper</a:t>
-            </a:r>
-            <a:endParaRPr lang="x-none" altLang="en-US" sz="1600">
-              <a:solidFill>
-                <a:schemeClr val="accent6">
-                  <a:lumMod val="50000"/>
-                </a:schemeClr>
-              </a:solidFill>
-              <a:latin typeface="Fira Code" panose="020B0609050000020004" charset="0"/>
-              <a:cs typeface="Fira Code" panose="020B0609050000020004" charset="0"/>
-            </a:endParaRPr>
-          </a:p>
-          <a:p>
-            <a:pPr marL="0" indent="0">
-              <a:buNone/>
-            </a:pPr>
-            <a:r>
-              <a:rPr lang="x-none" altLang="en-US" sz="1600">
-                <a:solidFill>
-                  <a:schemeClr val="accent6">
-                    <a:lumMod val="50000"/>
-                  </a:schemeClr>
-                </a:solidFill>
-                <a:latin typeface="Fira Code" panose="020B0609050000020004" charset="0"/>
-                <a:cs typeface="Fira Code" panose="020B0609050000020004" charset="0"/>
-              </a:rPr>
-              <a:t>    &gt; </a:t>
-            </a:r>
-            <a:r>
-              <a:rPr lang="x-none" altLang="en-US" sz="1600">
-                <a:solidFill>
-                  <a:schemeClr val="accent6">
-                    <a:lumMod val="75000"/>
-                  </a:schemeClr>
-                </a:solidFill>
-                <a:latin typeface="Fira Code" panose="020B0609050000020004" charset="0"/>
-                <a:cs typeface="Fira Code" panose="020B0609050000020004" charset="0"/>
-              </a:rPr>
-              <a:t>Not as popular as QGIS and ArcGIS is with desktop users. Maybe cause they are more</a:t>
-            </a:r>
-            <a:r>
-              <a:rPr lang="x-none" altLang="en-US" sz="1600">
-                <a:solidFill>
-                  <a:schemeClr val="accent6">
-                    <a:lumMod val="50000"/>
-                  </a:schemeClr>
-                </a:solidFill>
-                <a:latin typeface="Fira Code" panose="020B0609050000020004" charset="0"/>
-                <a:cs typeface="Fira Code" panose="020B0609050000020004" charset="0"/>
-              </a:rPr>
-              <a:t> </a:t>
-            </a:r>
-            <a:r>
-              <a:rPr lang="x-none" altLang="en-US" sz="1600">
-                <a:solidFill>
-                  <a:srgbClr val="92D050"/>
-                </a:solidFill>
-                <a:latin typeface="Fira Code" panose="020B0609050000020004" charset="0"/>
-                <a:cs typeface="Fira Code" panose="020B0609050000020004" charset="0"/>
-              </a:rPr>
-              <a:t>CLI </a:t>
-            </a:r>
-            <a:r>
-              <a:rPr lang="x-none" altLang="en-US" sz="1600">
-                <a:solidFill>
-                  <a:schemeClr val="accent6">
-                    <a:lumMod val="75000"/>
-                  </a:schemeClr>
-                </a:solidFill>
-                <a:latin typeface="Fira Code" panose="020B0609050000020004" charset="0"/>
-                <a:cs typeface="Fira Code" panose="020B0609050000020004" charset="0"/>
-              </a:rPr>
-              <a:t>oriented? but grass offers a GUI through</a:t>
+              <a:t>oriented? Although grass offers a GUI through</a:t>
             </a:r>
             <a:r>
               <a:rPr lang="x-none" altLang="en-US" sz="1600">
@@ -4984,11 +5166,13 @@
         <p:spPr>
           <a:xfrm>
             <a:off x="136525" y="25400"/>
-            <a:ext cx="10515600" cy="594360"/>
+            <a:ext cx="10515600" cy="415925"/>
           </a:xfrm>
         </p:spPr>
         <p:txBody>
-          <a:bodyPr/>
+          <a:bodyPr>
+            <a:normAutofit fontScale="90000"/>
+          </a:bodyPr>
           <a:p>
             <a:r>
               <a:rPr lang="x-none" altLang="en-US" sz="3200">
@@ -5036,8 +5220,8 @@
         </p:nvSpPr>
         <p:spPr>
           <a:xfrm>
-            <a:off x="136525" y="551815"/>
-            <a:ext cx="11749405" cy="6209030"/>
+            <a:off x="136525" y="-83185"/>
+            <a:ext cx="11749405" cy="6915785"/>
           </a:xfrm>
           <a:effectLst>
             <a:outerShdw blurRad="50800" dist="50800" dir="5400000" sx="98000" sy="98000" algn="ctr" rotWithShape="0">
@@ -5063,7 +5247,7 @@
                 <a:latin typeface="Fira Code" panose="020B0609050000020004" charset="0"/>
                 <a:cs typeface="Fira Code" panose="020B0609050000020004" charset="0"/>
               </a:rPr>
-              <a:t>    &gt; Enjoy the benefits.</a:t>
+              <a:t>    &gt; You probably have been using them.</a:t>
             </a:r>
             <a:endParaRPr lang="x-none" altLang="en-US" sz="1600">
               <a:solidFill>
@@ -5101,7 +5285,7 @@
                 <a:latin typeface="Fira Code" panose="020B0609050000020004" charset="0"/>
                 <a:cs typeface="Fira Code" panose="020B0609050000020004" charset="0"/>
               </a:rPr>
-              <a:t>Fast, free, flexible and extensible</a:t>
+              <a:t>Fast, free, open, flexible and extensible software</a:t>
             </a:r>
             <a:endParaRPr lang="x-none" altLang="en-US" sz="1600">
               <a:solidFill>
@@ -5139,7 +5323,85 @@
                 <a:latin typeface="Fira Code" panose="020B0609050000020004" charset="0"/>
                 <a:cs typeface="Fira Code" panose="020B0609050000020004" charset="0"/>
               </a:rPr>
-              <a:t>Support and Interoperable with other OSGeo member projects</a:t>
+              <a:t>Support and Interoperable with other OSGeo member projects such as QGIS, PostGIS among others.</a:t>
+            </a:r>
+            <a:endParaRPr lang="x-none" altLang="en-US" sz="1400">
+              <a:solidFill>
+                <a:schemeClr val="accent6">
+                  <a:lumMod val="75000"/>
+                </a:schemeClr>
+              </a:solidFill>
+              <a:latin typeface="Fira Code" panose="020B0609050000020004" charset="0"/>
+              <a:cs typeface="Fira Code" panose="020B0609050000020004" charset="0"/>
+            </a:endParaRPr>
+          </a:p>
+          <a:p>
+            <a:pPr marL="0" indent="0">
+              <a:buNone/>
+            </a:pPr>
+            <a:r>
+              <a:rPr lang="x-none" altLang="en-US" sz="1400">
+                <a:solidFill>
+                  <a:schemeClr val="accent6">
+                    <a:lumMod val="75000"/>
+                  </a:schemeClr>
+                </a:solidFill>
+                <a:latin typeface="Fira Code" panose="020B0609050000020004" charset="0"/>
+                <a:cs typeface="Fira Code" panose="020B0609050000020004" charset="0"/>
+              </a:rPr>
+              <a:t>         &gt;&gt; Supported by some GIS service providers and incorporated in their solution stack.</a:t>
+            </a:r>
+            <a:endParaRPr lang="x-none" altLang="en-US" sz="1400">
+              <a:solidFill>
+                <a:schemeClr val="accent6">
+                  <a:lumMod val="75000"/>
+                </a:schemeClr>
+              </a:solidFill>
+              <a:latin typeface="Fira Code" panose="020B0609050000020004" charset="0"/>
+              <a:cs typeface="Fira Code" panose="020B0609050000020004" charset="0"/>
+            </a:endParaRPr>
+          </a:p>
+          <a:p>
+            <a:pPr marL="0" indent="0">
+              <a:buNone/>
+            </a:pPr>
+            <a:r>
+              <a:rPr lang="x-none" altLang="en-US" sz="1400">
+                <a:solidFill>
+                  <a:schemeClr val="accent6">
+                    <a:lumMod val="75000"/>
+                  </a:schemeClr>
+                </a:solidFill>
+                <a:latin typeface="Fira Code" panose="020B0609050000020004" charset="0"/>
+                <a:cs typeface="Fira Code" panose="020B0609050000020004" charset="0"/>
+              </a:rPr>
+              <a:t>         &gt;&gt; Feature rich scriptable using CLI utilities</a:t>
+            </a:r>
+            <a:endParaRPr lang="x-none" altLang="en-US" sz="1400">
+              <a:solidFill>
+                <a:schemeClr val="accent6">
+                  <a:lumMod val="75000"/>
+                </a:schemeClr>
+              </a:solidFill>
+              <a:latin typeface="Fira Code" panose="020B0609050000020004" charset="0"/>
+              <a:cs typeface="Fira Code" panose="020B0609050000020004" charset="0"/>
+            </a:endParaRPr>
+          </a:p>
+          <a:p>
+            <a:pPr marL="0" indent="0">
+              <a:buNone/>
+            </a:pPr>
+            <a:r>
+              <a:rPr lang="x-none" altLang="en-US" sz="1400">
+                <a:solidFill>
+                  <a:schemeClr val="accent6">
+                    <a:lumMod val="75000"/>
+                  </a:schemeClr>
+                </a:solidFill>
+                <a:latin typeface="Fira Code" panose="020B0609050000020004" charset="0"/>
+                <a:cs typeface="Fira Code" panose="020B0609050000020004" charset="0"/>
+              </a:rPr>
+              <a:t>         &gt;&gt; Run batch and bulk processes, a plus if familiar with any cli scripting language. Bash, Python, tcl, perl, php</a:t>
             </a:r>
             <a:endParaRPr lang="x-none" altLang="en-US" sz="1600">
               <a:solidFill>
@@ -5165,11 +5427,46 @@
                 <a:latin typeface="Fira Code" panose="020B0609050000020004" charset="0"/>
                 <a:cs typeface="Fira Code" panose="020B0609050000020004" charset="0"/>
               </a:rPr>
-              <a:t>    &gt; </a:t>
+              <a:t>    </a:t>
             </a:r>
             <a:r>
               <a:rPr lang="x-none" altLang="en-US" sz="1600">
                 <a:solidFill>
+                  <a:srgbClr val="92D050"/>
+                </a:solidFill>
+                <a:latin typeface="Fira Code" panose="020B0609050000020004" charset="0"/>
+                <a:cs typeface="Fira Code" panose="020B0609050000020004" charset="0"/>
+                <a:sym typeface="+mn-ea"/>
+              </a:rPr>
+              <a:t>&gt; What the talk is not about.</a:t>
+            </a:r>
+            <a:endParaRPr lang="x-none" altLang="en-US" sz="1600">
+              <a:solidFill>
+                <a:srgbClr val="92D050"/>
+              </a:solidFill>
+              <a:latin typeface="Fira Code" panose="020B0609050000020004" charset="0"/>
+              <a:cs typeface="Fira Code" panose="020B0609050000020004" charset="0"/>
+              <a:sym typeface="+mn-ea"/>
+            </a:endParaRPr>
+          </a:p>
+          <a:p>
+            <a:pPr marL="0" indent="0">
+              <a:buNone/>
+            </a:pPr>
+            <a:r>
+              <a:rPr lang="x-none" altLang="en-US" sz="1600">
+                <a:solidFill>
+                  <a:srgbClr val="92D050"/>
+                </a:solidFill>
+                <a:latin typeface="Fira Code" panose="020B0609050000020004" charset="0"/>
+                <a:cs typeface="Fira Code" panose="020B0609050000020004" charset="0"/>
+                <a:sym typeface="+mn-ea"/>
+              </a:rPr>
+              <a:t>        </a:t>
+            </a:r>
+            <a:r>
+              <a:rPr lang="x-none" altLang="en-US" sz="1600">
+                <a:solidFill>
                   <a:schemeClr val="accent6">
                     <a:lumMod val="75000"/>
                   </a:schemeClr>
@@ -5177,87 +5474,7 @@
                 <a:latin typeface="Fira Code" panose="020B0609050000020004" charset="0"/>
                 <a:cs typeface="Fira Code" panose="020B0609050000020004" charset="0"/>
               </a:rPr>
-              <a:t>Not as popular as QGIS and ArcGIS is with desktop users. Maybe cause they are more</a:t>
-            </a:r>
-            <a:r>
-              <a:rPr lang="x-none" altLang="en-US" sz="1600">
-                <a:solidFill>
-                  <a:schemeClr val="accent6">
-                    <a:lumMod val="50000"/>
-                  </a:schemeClr>
-                </a:solidFill>
-                <a:latin typeface="Fira Code" panose="020B0609050000020004" charset="0"/>
-                <a:cs typeface="Fira Code" panose="020B0609050000020004" charset="0"/>
-              </a:rPr>
-              <a:t> </a:t>
-            </a:r>
-            <a:r>
-              <a:rPr lang="x-none" altLang="en-US" sz="1600">
-                <a:solidFill>
-                  <a:srgbClr val="92D050"/>
-                </a:solidFill>
-                <a:latin typeface="Fira Code" panose="020B0609050000020004" charset="0"/>
-                <a:cs typeface="Fira Code" panose="020B0609050000020004" charset="0"/>
-              </a:rPr>
-              <a:t>CLI </a:t>
-            </a:r>
-            <a:r>
-              <a:rPr lang="x-none" altLang="en-US" sz="1600">
-                <a:solidFill>
-                  <a:schemeClr val="accent6">
-                    <a:lumMod val="75000"/>
-                  </a:schemeClr>
-                </a:solidFill>
-                <a:latin typeface="Fira Code" panose="020B0609050000020004" charset="0"/>
-                <a:cs typeface="Fira Code" panose="020B0609050000020004" charset="0"/>
-              </a:rPr>
-              <a:t>oriented? but grass offers a GUI through</a:t>
-            </a:r>
-            <a:r>
-              <a:rPr lang="x-none" altLang="en-US" sz="1600">
-                <a:solidFill>
-                  <a:schemeClr val="accent6">
-                    <a:lumMod val="50000"/>
-                  </a:schemeClr>
-                </a:solidFill>
-                <a:latin typeface="Fira Code" panose="020B0609050000020004" charset="0"/>
-                <a:cs typeface="Fira Code" panose="020B0609050000020004" charset="0"/>
-              </a:rPr>
-              <a:t> </a:t>
-            </a:r>
-            <a:r>
-              <a:rPr lang="x-none" altLang="en-US" sz="1600">
-                <a:solidFill>
-                  <a:srgbClr val="92D050"/>
-                </a:solidFill>
-                <a:latin typeface="Fira Code" panose="020B0609050000020004" charset="0"/>
-                <a:cs typeface="Fira Code" panose="020B0609050000020004" charset="0"/>
-              </a:rPr>
-              <a:t>WxWidgets</a:t>
-            </a:r>
-            <a:r>
-              <a:rPr lang="x-none" altLang="en-US" sz="1600">
-                <a:solidFill>
-                  <a:schemeClr val="accent6">
-                    <a:lumMod val="50000"/>
-                  </a:schemeClr>
-                </a:solidFill>
-                <a:latin typeface="Fira Code" panose="020B0609050000020004" charset="0"/>
-                <a:cs typeface="Fira Code" panose="020B0609050000020004" charset="0"/>
-              </a:rPr>
-              <a:t> </a:t>
-            </a:r>
-            <a:r>
-              <a:rPr lang="x-none" altLang="en-US" sz="1600">
-                <a:solidFill>
-                  <a:schemeClr val="accent6">
-                    <a:lumMod val="75000"/>
-                  </a:schemeClr>
-                </a:solidFill>
-                <a:latin typeface="Fira Code" panose="020B0609050000020004" charset="0"/>
-                <a:cs typeface="Fira Code" panose="020B0609050000020004" charset="0"/>
-              </a:rPr>
-              <a:t>python api</a:t>
+              <a:t>&gt;&gt; A comparison between the two software</a:t>
             </a:r>
             <a:endParaRPr lang="x-none" altLang="en-US" sz="1600">
               <a:solidFill>
@@ -5283,18 +5500,59 @@
                 <a:latin typeface="Fira Code" panose="020B0609050000020004" charset="0"/>
                 <a:cs typeface="Fira Code" panose="020B0609050000020004" charset="0"/>
               </a:rPr>
-              <a:t>    &gt; Provide tools for both </a:t>
-            </a:r>
+              <a:t>        &gt;&gt; Promoting their use compared to others stack </a:t>
+            </a:r>
+            <a:endParaRPr lang="x-none" altLang="en-US" sz="1600">
+              <a:solidFill>
+                <a:schemeClr val="accent6">
+                  <a:lumMod val="75000"/>
+                </a:schemeClr>
+              </a:solidFill>
+              <a:latin typeface="Fira Code" panose="020B0609050000020004" charset="0"/>
+              <a:cs typeface="Fira Code" panose="020B0609050000020004" charset="0"/>
+            </a:endParaRPr>
+          </a:p>
+          <a:p>
+            <a:pPr marL="0" indent="0">
+              <a:buNone/>
+            </a:pPr>
             <a:r>
               <a:rPr lang="x-none" altLang="en-US" sz="1600">
                 <a:solidFill>
+                  <a:schemeClr val="accent6">
+                    <a:lumMod val="75000"/>
+                  </a:schemeClr>
+                </a:solidFill>
+                <a:latin typeface="Fira Code" panose="020B0609050000020004" charset="0"/>
+                <a:cs typeface="Fira Code" panose="020B0609050000020004" charset="0"/>
+              </a:rPr>
+              <a:t>    </a:t>
+            </a:r>
+            <a:r>
+              <a:rPr lang="x-none" altLang="en-US" sz="1600">
+                <a:solidFill>
                   <a:srgbClr val="92D050"/>
                 </a:solidFill>
                 <a:latin typeface="Fira Code" panose="020B0609050000020004" charset="0"/>
                 <a:cs typeface="Fira Code" panose="020B0609050000020004" charset="0"/>
-              </a:rPr>
-              <a:t>raster</a:t>
-            </a:r>
+                <a:sym typeface="+mn-ea"/>
+              </a:rPr>
+              <a:t>&gt; Who is without a flaw?</a:t>
+            </a:r>
+            <a:endParaRPr lang="x-none" altLang="en-US" sz="1600">
+              <a:solidFill>
+                <a:schemeClr val="accent6">
+                  <a:lumMod val="75000"/>
+                </a:schemeClr>
+              </a:solidFill>
+              <a:latin typeface="Fira Code" panose="020B0609050000020004" charset="0"/>
+              <a:cs typeface="Fira Code" panose="020B0609050000020004" charset="0"/>
+            </a:endParaRPr>
+          </a:p>
+          <a:p>
+            <a:pPr marL="0" indent="0">
+              <a:buNone/>
+            </a:pPr>
             <a:r>
               <a:rPr lang="x-none" altLang="en-US" sz="1600">
                 <a:solidFill>
@@ -5305,18 +5563,48 @@
                 <a:latin typeface="Fira Code" panose="020B0609050000020004" charset="0"/>
                 <a:cs typeface="Fira Code" panose="020B0609050000020004" charset="0"/>
               </a:rPr>
-              <a:t> and </a:t>
-            </a:r>
+              <a:t>        &gt;&gt; Not really many articles/docs on the direct usage. The most common ones are using bindings or wrappers using other languages python, R, java, javascript</a:t>
+            </a:r>
+            <a:endParaRPr lang="x-none" altLang="en-US" sz="1600">
+              <a:solidFill>
+                <a:schemeClr val="accent6">
+                  <a:lumMod val="75000"/>
+                </a:schemeClr>
+              </a:solidFill>
+              <a:latin typeface="Fira Code" panose="020B0609050000020004" charset="0"/>
+              <a:cs typeface="Fira Code" panose="020B0609050000020004" charset="0"/>
+            </a:endParaRPr>
+          </a:p>
+          <a:p>
+            <a:pPr marL="0" indent="0">
+              <a:buNone/>
+            </a:pPr>
             <a:r>
               <a:rPr lang="x-none" altLang="en-US" sz="1600">
                 <a:solidFill>
-                  <a:srgbClr val="92D050"/>
-                </a:solidFill>
-                <a:latin typeface="Fira Code" panose="020B0609050000020004" charset="0"/>
-                <a:cs typeface="Fira Code" panose="020B0609050000020004" charset="0"/>
-              </a:rPr>
-              <a:t>vector</a:t>
-            </a:r>
+                  <a:schemeClr val="accent6">
+                    <a:lumMod val="75000"/>
+                  </a:schemeClr>
+                </a:solidFill>
+                <a:latin typeface="Fira Code" panose="020B0609050000020004" charset="0"/>
+                <a:cs typeface="Fira Code" panose="020B0609050000020004" charset="0"/>
+              </a:rPr>
+              <a:t>        &gt;&gt; The CLI/text based interfaces can be daunting to beginners</a:t>
+            </a:r>
+            <a:endParaRPr lang="x-none" altLang="en-US" sz="1600">
+              <a:solidFill>
+                <a:schemeClr val="accent6">
+                  <a:lumMod val="75000"/>
+                </a:schemeClr>
+              </a:solidFill>
+              <a:latin typeface="Fira Code" panose="020B0609050000020004" charset="0"/>
+              <a:cs typeface="Fira Code" panose="020B0609050000020004" charset="0"/>
+            </a:endParaRPr>
+          </a:p>
+          <a:p>
+            <a:pPr marL="0" indent="0">
+              <a:buNone/>
+            </a:pPr>
             <a:r>
               <a:rPr lang="x-none" altLang="en-US" sz="1600">
                 <a:solidFill>
@@ -5327,7 +5615,7 @@
                 <a:latin typeface="Fira Code" panose="020B0609050000020004" charset="0"/>
                 <a:cs typeface="Fira Code" panose="020B0609050000020004" charset="0"/>
               </a:rPr>
-              <a:t> data processing</a:t>
+              <a:t>        &gt;&gt; Grass GUI and workflow  o</a:t>
             </a:r>
             <a:endParaRPr lang="x-none" altLang="en-US" sz="1600">
               <a:solidFill>
@@ -5364,6 +5652,532 @@
 </file>
 
 <file path=ppt/slides/slide6.xml><?xml version="1.0" encoding="utf-8"?>
+<p:sld xmlns:a="http://schemas.openxmlformats.org/drawingml/2006/main" xmlns:r="http://schemas.openxmlformats.org/officeDocument/2006/relationships" xmlns:p="http://schemas.openxmlformats.org/presentationml/2006/main">
+  <p:cSld>
+    <p:bg>
+      <p:bgPr>
+        <a:solidFill>
+          <a:schemeClr val="tx1"/>
+        </a:solidFill>
+        <a:effectLst/>
+      </p:bgPr>
+    </p:bg>
+    <p:spTree>
+      <p:nvGrpSpPr>
+        <p:cNvPr id="1" name=""/>
+        <p:cNvGrpSpPr/>
+        <p:nvPr/>
+      </p:nvGrpSpPr>
+      <p:grpSpPr/>
+      <p:pic>
+        <p:nvPicPr>
+          <p:cNvPr id="12" name="Picture 11" descr="drawing (copy)_1_1"/>
+          <p:cNvPicPr>
+            <a:picLocks noChangeAspect="1"/>
+          </p:cNvPicPr>
+          <p:nvPr/>
+        </p:nvPicPr>
+        <p:blipFill>
+          <a:blip r:embed="rId1">
+            <a:clrChange>
+              <a:clrFrom>
+                <a:srgbClr val="96FADD">
+                  <a:alpha val="100000"/>
+                </a:srgbClr>
+              </a:clrFrom>
+              <a:clrTo>
+                <a:srgbClr val="96FADD">
+                  <a:alpha val="100000"/>
+                  <a:alpha val="0"/>
+                </a:srgbClr>
+              </a:clrTo>
+            </a:clrChange>
+            <a:lum bright="-84000" contrast="6000"/>
+          </a:blip>
+          <a:stretch>
+            <a:fillRect/>
+          </a:stretch>
+        </p:blipFill>
+        <p:spPr>
+          <a:xfrm>
+            <a:off x="136525" y="25400"/>
+            <a:ext cx="11948160" cy="6807200"/>
+          </a:xfrm>
+          <a:prstGeom prst="rect">
+            <a:avLst/>
+          </a:prstGeom>
+          <a:noFill/>
+          <a:ln>
+            <a:noFill/>
+          </a:ln>
+          <a:effectLst/>
+        </p:spPr>
+      </p:pic>
+      <p:sp>
+        <p:nvSpPr>
+          <p:cNvPr id="5" name="Title 4"/>
+          <p:cNvSpPr>
+            <a:spLocks noGrp="1"/>
+          </p:cNvSpPr>
+          <p:nvPr>
+            <p:ph type="title"/>
+          </p:nvPr>
+        </p:nvSpPr>
+        <p:spPr>
+          <a:xfrm>
+            <a:off x="136525" y="25400"/>
+            <a:ext cx="10515600" cy="415925"/>
+          </a:xfrm>
+        </p:spPr>
+        <p:txBody>
+          <a:bodyPr>
+            <a:normAutofit fontScale="90000"/>
+          </a:bodyPr>
+          <a:p>
+            <a:r>
+              <a:rPr lang="x-none" altLang="en-US" sz="3200">
+                <a:solidFill>
+                  <a:srgbClr val="53F22E"/>
+                </a:solidFill>
+                <a:effectLst>
+                  <a:outerShdw blurRad="38100" dist="19050" dir="2700000" algn="tl" rotWithShape="0">
+                    <a:schemeClr val="dk1">
+                      <a:alpha val="40000"/>
+                    </a:schemeClr>
+                  </a:outerShdw>
+                </a:effectLst>
+                <a:latin typeface="Fira Code" panose="020B0609050000020004" charset="0"/>
+                <a:cs typeface="Fira Code" panose="020B0609050000020004" charset="0"/>
+              </a:rPr>
+              <a:t>cont'd.</a:t>
+            </a:r>
+            <a:endParaRPr lang="x-none" altLang="en-US">
+              <a:solidFill>
+                <a:srgbClr val="53F22E"/>
+              </a:solidFill>
+              <a:effectLst>
+                <a:outerShdw blurRad="38100" dist="19050" dir="2700000" algn="tl" rotWithShape="0">
+                  <a:schemeClr val="dk1">
+                    <a:alpha val="40000"/>
+                  </a:schemeClr>
+                </a:outerShdw>
+              </a:effectLst>
+              <a:latin typeface="Fira Code" panose="020B0609050000020004" charset="0"/>
+              <a:cs typeface="Fira Code" panose="020B0609050000020004" charset="0"/>
+            </a:endParaRPr>
+          </a:p>
+        </p:txBody>
+      </p:sp>
+      <p:sp>
+        <p:nvSpPr>
+          <p:cNvPr id="8" name="Content Placeholder 7"/>
+          <p:cNvSpPr>
+            <a:spLocks noGrp="1"/>
+          </p:cNvSpPr>
+          <p:nvPr>
+            <p:ph sz="half" idx="2"/>
+          </p:nvPr>
+        </p:nvSpPr>
+        <p:spPr>
+          <a:xfrm>
+            <a:off x="136525" y="347980"/>
+            <a:ext cx="11749405" cy="6484620"/>
+          </a:xfrm>
+          <a:effectLst>
+            <a:outerShdw blurRad="50800" dist="50800" dir="5400000" sx="98000" sy="98000" algn="ctr" rotWithShape="0">
+              <a:srgbClr val="000000">
+                <a:alpha val="100000"/>
+              </a:srgbClr>
+            </a:outerShdw>
+          </a:effectLst>
+        </p:spPr>
+        <p:txBody>
+          <a:bodyPr>
+            <a:noAutofit/>
+          </a:bodyPr>
+          <a:p>
+            <a:pPr marL="0" indent="0">
+              <a:buNone/>
+            </a:pPr>
+            <a:r>
+              <a:rPr lang="x-none" altLang="en-US" sz="1800">
+                <a:solidFill>
+                  <a:srgbClr val="92D050"/>
+                </a:solidFill>
+                <a:latin typeface="Fira Code" panose="020B0609050000020004" charset="0"/>
+                <a:cs typeface="Fira Code" panose="020B0609050000020004" charset="0"/>
+              </a:rPr>
+              <a:t>    &gt; Expected outcome.</a:t>
+            </a:r>
+            <a:endParaRPr lang="x-none" altLang="en-US" sz="1600">
+              <a:solidFill>
+                <a:schemeClr val="accent6">
+                  <a:lumMod val="50000"/>
+                </a:schemeClr>
+              </a:solidFill>
+              <a:latin typeface="Fira Code" panose="020B0609050000020004" charset="0"/>
+              <a:cs typeface="Fira Code" panose="020B0609050000020004" charset="0"/>
+            </a:endParaRPr>
+          </a:p>
+          <a:p>
+            <a:pPr marL="0" indent="0">
+              <a:buNone/>
+            </a:pPr>
+            <a:r>
+              <a:rPr lang="x-none" altLang="en-US" sz="1600">
+                <a:solidFill>
+                  <a:schemeClr val="accent6">
+                    <a:lumMod val="50000"/>
+                  </a:schemeClr>
+                </a:solidFill>
+                <a:latin typeface="Fira Code" panose="020B0609050000020004" charset="0"/>
+                <a:cs typeface="Fira Code" panose="020B0609050000020004" charset="0"/>
+              </a:rPr>
+              <a:t>        &gt;&gt; </a:t>
+            </a:r>
+            <a:r>
+              <a:rPr lang="x-none" altLang="en-US" sz="1600">
+                <a:solidFill>
+                  <a:schemeClr val="accent6">
+                    <a:lumMod val="75000"/>
+                  </a:schemeClr>
+                </a:solidFill>
+                <a:latin typeface="Fira Code" panose="020B0609050000020004" charset="0"/>
+                <a:cs typeface="Fira Code" panose="020B0609050000020004" charset="0"/>
+              </a:rPr>
+              <a:t>To be comfortable with some of the common cmd</a:t>
+            </a:r>
+            <a:endParaRPr lang="x-none" altLang="en-US" sz="1600">
+              <a:solidFill>
+                <a:schemeClr val="accent6">
+                  <a:lumMod val="75000"/>
+                </a:schemeClr>
+              </a:solidFill>
+              <a:latin typeface="Fira Code" panose="020B0609050000020004" charset="0"/>
+              <a:cs typeface="Fira Code" panose="020B0609050000020004" charset="0"/>
+            </a:endParaRPr>
+          </a:p>
+          <a:p>
+            <a:pPr marL="0" indent="0">
+              <a:buNone/>
+            </a:pPr>
+            <a:r>
+              <a:rPr lang="x-none" altLang="en-US" sz="1400">
+                <a:solidFill>
+                  <a:schemeClr val="accent6">
+                    <a:lumMod val="50000"/>
+                  </a:schemeClr>
+                </a:solidFill>
+                <a:latin typeface="Fira Code" panose="020B0609050000020004" charset="0"/>
+                <a:cs typeface="Fira Code" panose="020B0609050000020004" charset="0"/>
+              </a:rPr>
+              <a:t>         &gt;&gt; </a:t>
+            </a:r>
+            <a:r>
+              <a:rPr lang="x-none" altLang="en-US" sz="1400">
+                <a:solidFill>
+                  <a:schemeClr val="accent6">
+                    <a:lumMod val="75000"/>
+                  </a:schemeClr>
+                </a:solidFill>
+                <a:latin typeface="Fira Code" panose="020B0609050000020004" charset="0"/>
+                <a:cs typeface="Fira Code" panose="020B0609050000020004" charset="0"/>
+              </a:rPr>
+              <a:t>Perform some of basic spatial operations using both tool</a:t>
+            </a:r>
+            <a:endParaRPr lang="x-none" altLang="en-US" sz="1400">
+              <a:solidFill>
+                <a:schemeClr val="accent6">
+                  <a:lumMod val="75000"/>
+                </a:schemeClr>
+              </a:solidFill>
+              <a:latin typeface="Fira Code" panose="020B0609050000020004" charset="0"/>
+              <a:cs typeface="Fira Code" panose="020B0609050000020004" charset="0"/>
+            </a:endParaRPr>
+          </a:p>
+          <a:p>
+            <a:pPr marL="0" indent="0">
+              <a:buNone/>
+            </a:pPr>
+            <a:r>
+              <a:rPr lang="x-none" altLang="en-US" sz="1400">
+                <a:solidFill>
+                  <a:schemeClr val="accent6">
+                    <a:lumMod val="75000"/>
+                  </a:schemeClr>
+                </a:solidFill>
+                <a:latin typeface="Fira Code" panose="020B0609050000020004" charset="0"/>
+                <a:cs typeface="Fira Code" panose="020B0609050000020004" charset="0"/>
+              </a:rPr>
+              <a:t>         &gt;&gt; Understanding of the various workflow.</a:t>
+            </a:r>
+            <a:endParaRPr lang="x-none" altLang="en-US" sz="1400">
+              <a:solidFill>
+                <a:schemeClr val="accent6">
+                  <a:lumMod val="75000"/>
+                </a:schemeClr>
+              </a:solidFill>
+              <a:latin typeface="Fira Code" panose="020B0609050000020004" charset="0"/>
+              <a:cs typeface="Fira Code" panose="020B0609050000020004" charset="0"/>
+            </a:endParaRPr>
+          </a:p>
+          <a:p>
+            <a:pPr marL="0" indent="0">
+              <a:buNone/>
+            </a:pPr>
+            <a:r>
+              <a:rPr lang="x-none" altLang="en-US" sz="1400">
+                <a:solidFill>
+                  <a:schemeClr val="accent6">
+                    <a:lumMod val="75000"/>
+                  </a:schemeClr>
+                </a:solidFill>
+                <a:latin typeface="Fira Code" panose="020B0609050000020004" charset="0"/>
+                <a:cs typeface="Fira Code" panose="020B0609050000020004" charset="0"/>
+              </a:rPr>
+              <a:t>         &gt;&gt; Be dangerous enough to make your colleague think you're a hacker</a:t>
+            </a:r>
+            <a:endParaRPr lang="x-none" altLang="en-US" sz="1600">
+              <a:solidFill>
+                <a:schemeClr val="accent6">
+                  <a:lumMod val="50000"/>
+                </a:schemeClr>
+              </a:solidFill>
+              <a:latin typeface="Fira Code" panose="020B0609050000020004" charset="0"/>
+              <a:cs typeface="Fira Code" panose="020B0609050000020004" charset="0"/>
+            </a:endParaRPr>
+          </a:p>
+          <a:p>
+            <a:pPr marL="0" indent="0">
+              <a:buNone/>
+            </a:pPr>
+            <a:r>
+              <a:rPr lang="x-none" altLang="en-US" sz="1600">
+                <a:solidFill>
+                  <a:schemeClr val="accent6">
+                    <a:lumMod val="50000"/>
+                  </a:schemeClr>
+                </a:solidFill>
+                <a:latin typeface="Fira Code" panose="020B0609050000020004" charset="0"/>
+                <a:cs typeface="Fira Code" panose="020B0609050000020004" charset="0"/>
+              </a:rPr>
+              <a:t>    </a:t>
+            </a:r>
+            <a:r>
+              <a:rPr lang="x-none" altLang="en-US" sz="1600">
+                <a:solidFill>
+                  <a:srgbClr val="92D050"/>
+                </a:solidFill>
+                <a:latin typeface="Fira Code" panose="020B0609050000020004" charset="0"/>
+                <a:cs typeface="Fira Code" panose="020B0609050000020004" charset="0"/>
+                <a:sym typeface="+mn-ea"/>
+              </a:rPr>
+              <a:t>&gt; What the talk is not about.</a:t>
+            </a:r>
+            <a:endParaRPr lang="x-none" altLang="en-US" sz="1600">
+              <a:solidFill>
+                <a:srgbClr val="92D050"/>
+              </a:solidFill>
+              <a:latin typeface="Fira Code" panose="020B0609050000020004" charset="0"/>
+              <a:cs typeface="Fira Code" panose="020B0609050000020004" charset="0"/>
+              <a:sym typeface="+mn-ea"/>
+            </a:endParaRPr>
+          </a:p>
+          <a:p>
+            <a:pPr marL="0" indent="0">
+              <a:buNone/>
+            </a:pPr>
+            <a:r>
+              <a:rPr lang="x-none" altLang="en-US" sz="1600">
+                <a:solidFill>
+                  <a:srgbClr val="92D050"/>
+                </a:solidFill>
+                <a:latin typeface="Fira Code" panose="020B0609050000020004" charset="0"/>
+                <a:cs typeface="Fira Code" panose="020B0609050000020004" charset="0"/>
+                <a:sym typeface="+mn-ea"/>
+              </a:rPr>
+              <a:t>        </a:t>
+            </a:r>
+            <a:r>
+              <a:rPr lang="x-none" altLang="en-US" sz="1600">
+                <a:solidFill>
+                  <a:schemeClr val="accent6">
+                    <a:lumMod val="75000"/>
+                  </a:schemeClr>
+                </a:solidFill>
+                <a:latin typeface="Fira Code" panose="020B0609050000020004" charset="0"/>
+                <a:cs typeface="Fira Code" panose="020B0609050000020004" charset="0"/>
+              </a:rPr>
+              <a:t>&gt;&gt; A comparison between the two software</a:t>
+            </a:r>
+            <a:endParaRPr lang="x-none" altLang="en-US" sz="1600">
+              <a:solidFill>
+                <a:schemeClr val="accent6">
+                  <a:lumMod val="75000"/>
+                </a:schemeClr>
+              </a:solidFill>
+              <a:latin typeface="Fira Code" panose="020B0609050000020004" charset="0"/>
+              <a:cs typeface="Fira Code" panose="020B0609050000020004" charset="0"/>
+            </a:endParaRPr>
+          </a:p>
+          <a:p>
+            <a:pPr marL="0" indent="0">
+              <a:buNone/>
+            </a:pPr>
+            <a:r>
+              <a:rPr lang="x-none" altLang="en-US" sz="1600">
+                <a:solidFill>
+                  <a:schemeClr val="accent6">
+                    <a:lumMod val="75000"/>
+                  </a:schemeClr>
+                </a:solidFill>
+                <a:latin typeface="Fira Code" panose="020B0609050000020004" charset="0"/>
+                <a:cs typeface="Fira Code" panose="020B0609050000020004" charset="0"/>
+              </a:rPr>
+              <a:t>        &gt;&gt; Promoting their use compared to others stack </a:t>
+            </a:r>
+            <a:endParaRPr lang="x-none" altLang="en-US" sz="1600">
+              <a:solidFill>
+                <a:schemeClr val="accent6">
+                  <a:lumMod val="75000"/>
+                </a:schemeClr>
+              </a:solidFill>
+              <a:latin typeface="Fira Code" panose="020B0609050000020004" charset="0"/>
+              <a:cs typeface="Fira Code" panose="020B0609050000020004" charset="0"/>
+            </a:endParaRPr>
+          </a:p>
+          <a:p>
+            <a:pPr marL="0" indent="0">
+              <a:buNone/>
+            </a:pPr>
+            <a:r>
+              <a:rPr lang="x-none" altLang="en-US" sz="1600">
+                <a:solidFill>
+                  <a:schemeClr val="accent6">
+                    <a:lumMod val="75000"/>
+                  </a:schemeClr>
+                </a:solidFill>
+                <a:latin typeface="Fira Code" panose="020B0609050000020004" charset="0"/>
+                <a:cs typeface="Fira Code" panose="020B0609050000020004" charset="0"/>
+              </a:rPr>
+              <a:t>    </a:t>
+            </a:r>
+            <a:r>
+              <a:rPr lang="x-none" altLang="en-US" sz="1600">
+                <a:solidFill>
+                  <a:srgbClr val="92D050"/>
+                </a:solidFill>
+                <a:latin typeface="Fira Code" panose="020B0609050000020004" charset="0"/>
+                <a:cs typeface="Fira Code" panose="020B0609050000020004" charset="0"/>
+                <a:sym typeface="+mn-ea"/>
+              </a:rPr>
+              <a:t>&gt; WExpectations</a:t>
+            </a:r>
+            <a:endParaRPr lang="x-none" altLang="en-US" sz="1600">
+              <a:solidFill>
+                <a:schemeClr val="accent6">
+                  <a:lumMod val="75000"/>
+                </a:schemeClr>
+              </a:solidFill>
+              <a:latin typeface="Fira Code" panose="020B0609050000020004" charset="0"/>
+              <a:cs typeface="Fira Code" panose="020B0609050000020004" charset="0"/>
+            </a:endParaRPr>
+          </a:p>
+          <a:p>
+            <a:pPr marL="0" indent="0">
+              <a:buNone/>
+            </a:pPr>
+            <a:r>
+              <a:rPr lang="x-none" altLang="en-US" sz="1600">
+                <a:solidFill>
+                  <a:schemeClr val="accent6">
+                    <a:lumMod val="75000"/>
+                  </a:schemeClr>
+                </a:solidFill>
+                <a:latin typeface="Fira Code" panose="020B0609050000020004" charset="0"/>
+                <a:cs typeface="Fira Code" panose="020B0609050000020004" charset="0"/>
+              </a:rPr>
+              <a:t>    &gt; Provide tools for both </a:t>
+            </a:r>
+            <a:r>
+              <a:rPr lang="x-none" altLang="en-US" sz="1600">
+                <a:solidFill>
+                  <a:srgbClr val="92D050"/>
+                </a:solidFill>
+                <a:latin typeface="Fira Code" panose="020B0609050000020004" charset="0"/>
+                <a:cs typeface="Fira Code" panose="020B0609050000020004" charset="0"/>
+              </a:rPr>
+              <a:t>raster</a:t>
+            </a:r>
+            <a:r>
+              <a:rPr lang="x-none" altLang="en-US" sz="1600">
+                <a:solidFill>
+                  <a:schemeClr val="accent6">
+                    <a:lumMod val="75000"/>
+                  </a:schemeClr>
+                </a:solidFill>
+                <a:latin typeface="Fira Code" panose="020B0609050000020004" charset="0"/>
+                <a:cs typeface="Fira Code" panose="020B0609050000020004" charset="0"/>
+              </a:rPr>
+              <a:t> and </a:t>
+            </a:r>
+            <a:r>
+              <a:rPr lang="x-none" altLang="en-US" sz="1600">
+                <a:solidFill>
+                  <a:srgbClr val="92D050"/>
+                </a:solidFill>
+                <a:latin typeface="Fira Code" panose="020B0609050000020004" charset="0"/>
+                <a:cs typeface="Fira Code" panose="020B0609050000020004" charset="0"/>
+              </a:rPr>
+              <a:t>vector</a:t>
+            </a:r>
+            <a:r>
+              <a:rPr lang="x-none" altLang="en-US" sz="1600">
+                <a:solidFill>
+                  <a:schemeClr val="accent6">
+                    <a:lumMod val="75000"/>
+                  </a:schemeClr>
+                </a:solidFill>
+                <a:latin typeface="Fira Code" panose="020B0609050000020004" charset="0"/>
+                <a:cs typeface="Fira Code" panose="020B0609050000020004" charset="0"/>
+              </a:rPr>
+              <a:t> data processing</a:t>
+            </a:r>
+            <a:endParaRPr lang="x-none" altLang="en-US" sz="1600">
+              <a:solidFill>
+                <a:schemeClr val="accent6">
+                  <a:lumMod val="75000"/>
+                </a:schemeClr>
+              </a:solidFill>
+              <a:latin typeface="Fira Code" panose="020B0609050000020004" charset="0"/>
+              <a:cs typeface="Fira Code" panose="020B0609050000020004" charset="0"/>
+            </a:endParaRPr>
+          </a:p>
+          <a:p>
+            <a:pPr marL="0" indent="0">
+              <a:buNone/>
+            </a:pPr>
+            <a:endParaRPr lang="x-none" altLang="en-US" sz="1600" i="1">
+              <a:solidFill>
+                <a:schemeClr val="accent6">
+                  <a:lumMod val="75000"/>
+                </a:schemeClr>
+              </a:solidFill>
+              <a:latin typeface="Fira Code" panose="020B0609050000020004" charset="0"/>
+              <a:cs typeface="Fira Code" panose="020B0609050000020004" charset="0"/>
+            </a:endParaRPr>
+          </a:p>
+        </p:txBody>
+      </p:sp>
+    </p:spTree>
+  </p:cSld>
+  <p:clrMapOvr>
+    <a:masterClrMapping/>
+  </p:clrMapOvr>
+</p:sld>
+</file>
+
+<file path=ppt/slides/slide7.xml><?xml version="1.0" encoding="utf-8"?>
 <p:sld xmlns:a="http://schemas.openxmlformats.org/drawingml/2006/main" xmlns:r="http://schemas.openxmlformats.org/officeDocument/2006/relationships" xmlns:p="http://schemas.openxmlformats.org/presentationml/2006/main">
   <p:cSld>
     <p:bg>
@@ -5755,7 +6569,7 @@
 </p:sld>
 </file>
 
-<file path=ppt/slides/slide7.xml><?xml version="1.0" encoding="utf-8"?>
+<file path=ppt/slides/slide8.xml><?xml version="1.0" encoding="utf-8"?>
 <p:sld xmlns:a="http://schemas.openxmlformats.org/drawingml/2006/main" xmlns:r="http://schemas.openxmlformats.org/officeDocument/2006/relationships" xmlns:p="http://schemas.openxmlformats.org/presentationml/2006/main">
   <p:cSld>
     <p:bg>
@@ -6199,7 +7013,7 @@
 </p:sld>
 </file>
 
-<file path=ppt/slides/slide8.xml><?xml version="1.0" encoding="utf-8"?>
+<file path=ppt/slides/slide9.xml><?xml version="1.0" encoding="utf-8"?>
 <p:sld xmlns:a="http://schemas.openxmlformats.org/drawingml/2006/main" xmlns:r="http://schemas.openxmlformats.org/officeDocument/2006/relationships" xmlns:p="http://schemas.openxmlformats.org/presentationml/2006/main">
   <p:cSld>
     <p:bg>

</xml_diff>

<commit_message>
add code of conduct
</commit_message>
<xml_diff>
--- a/Presentation.pptx
+++ b/Presentation.pptx
@@ -5537,7 +5537,7 @@
                 <a:cs typeface="Fira Code" panose="020B0609050000020004" charset="0"/>
                 <a:sym typeface="+mn-ea"/>
               </a:rPr>
-              <a:t>&gt; Who is without a flaw?</a:t>
+              <a:t>&gt; Who is without a flaw(s)?</a:t>
             </a:r>
             <a:endParaRPr lang="x-none" altLang="en-US" sz="1600">
               <a:solidFill>
@@ -5615,7 +5615,7 @@
                 <a:latin typeface="Fira Code" panose="020B0609050000020004" charset="0"/>
                 <a:cs typeface="Fira Code" panose="020B0609050000020004" charset="0"/>
               </a:rPr>
-              <a:t>        &gt;&gt; Grass GUI and workflow  o</a:t>
+              <a:t>        &gt;&gt; Grass GUI and workflow can be involving if not used to it.</a:t>
             </a:r>
             <a:endParaRPr lang="x-none" altLang="en-US" sz="1600">
               <a:solidFill>
@@ -5937,6 +5937,32 @@
               </a:rPr>
               <a:t>         &gt;&gt; Be dangerous enough to make your colleague think you're a hacker</a:t>
             </a:r>
+            <a:endParaRPr lang="x-none" altLang="en-US" sz="1400">
+              <a:solidFill>
+                <a:schemeClr val="accent6">
+                  <a:lumMod val="75000"/>
+                </a:schemeClr>
+              </a:solidFill>
+              <a:latin typeface="Fira Code" panose="020B0609050000020004" charset="0"/>
+              <a:cs typeface="Fira Code" panose="020B0609050000020004" charset="0"/>
+            </a:endParaRPr>
+          </a:p>
+          <a:p>
+            <a:pPr marL="0" indent="0">
+              <a:buNone/>
+            </a:pPr>
+            <a:r>
+              <a:rPr lang="x-none" altLang="en-US" sz="1400">
+                <a:solidFill>
+                  <a:schemeClr val="accent6">
+                    <a:lumMod val="75000"/>
+                  </a:schemeClr>
+                </a:solidFill>
+                <a:latin typeface="Fira Code" panose="020B0609050000020004" charset="0"/>
+                <a:cs typeface="Fira Code" panose="020B0609050000020004" charset="0"/>
+              </a:rPr>
+              <a:t>         &gt;&gt; Desirable: start chaining your analysis and processing into reproducible programs or scripts</a:t>
+            </a:r>
             <a:endParaRPr lang="x-none" altLang="en-US" sz="1600">
               <a:solidFill>
                 <a:schemeClr val="accent6">
@@ -6071,7 +6097,7 @@
                 <a:cs typeface="Fira Code" panose="020B0609050000020004" charset="0"/>
                 <a:sym typeface="+mn-ea"/>
               </a:rPr>
-              <a:t>&gt; WExpectations</a:t>
+              <a:t>&gt; What to bring or consider: </a:t>
             </a:r>
             <a:endParaRPr lang="x-none" altLang="en-US" sz="1600">
               <a:solidFill>
@@ -6097,18 +6123,48 @@
                 <a:latin typeface="Fira Code" panose="020B0609050000020004" charset="0"/>
                 <a:cs typeface="Fira Code" panose="020B0609050000020004" charset="0"/>
               </a:rPr>
-              <a:t>    &gt; Provide tools for both </a:t>
-            </a:r>
+              <a:t>       &gt;&gt; Be aware of others           &gt;&gt; Be open to all questions and viewpoints</a:t>
+            </a:r>
+            <a:endParaRPr lang="x-none" altLang="en-US" sz="1600">
+              <a:solidFill>
+                <a:schemeClr val="accent6">
+                  <a:lumMod val="75000"/>
+                </a:schemeClr>
+              </a:solidFill>
+              <a:latin typeface="Fira Code" panose="020B0609050000020004" charset="0"/>
+              <a:cs typeface="Fira Code" panose="020B0609050000020004" charset="0"/>
+            </a:endParaRPr>
+          </a:p>
+          <a:p>
+            <a:pPr marL="0" indent="0">
+              <a:buNone/>
+            </a:pPr>
             <a:r>
               <a:rPr lang="x-none" altLang="en-US" sz="1600">
                 <a:solidFill>
-                  <a:srgbClr val="92D050"/>
-                </a:solidFill>
-                <a:latin typeface="Fira Code" panose="020B0609050000020004" charset="0"/>
-                <a:cs typeface="Fira Code" panose="020B0609050000020004" charset="0"/>
-              </a:rPr>
-              <a:t>raster</a:t>
-            </a:r>
+                  <a:schemeClr val="accent6">
+                    <a:lumMod val="75000"/>
+                  </a:schemeClr>
+                </a:solidFill>
+                <a:latin typeface="Fira Code" panose="020B0609050000020004" charset="0"/>
+                <a:cs typeface="Fira Code" panose="020B0609050000020004" charset="0"/>
+              </a:rPr>
+              <a:t>       &gt;&gt; Be friendly and patient      &gt;&gt; Be understanding of differences </a:t>
+            </a:r>
+            <a:endParaRPr lang="x-none" altLang="en-US" sz="1600">
+              <a:solidFill>
+                <a:schemeClr val="accent6">
+                  <a:lumMod val="75000"/>
+                </a:schemeClr>
+              </a:solidFill>
+              <a:latin typeface="Fira Code" panose="020B0609050000020004" charset="0"/>
+              <a:cs typeface="Fira Code" panose="020B0609050000020004" charset="0"/>
+            </a:endParaRPr>
+          </a:p>
+          <a:p>
+            <a:pPr marL="0" indent="0">
+              <a:buNone/>
+            </a:pPr>
             <a:r>
               <a:rPr lang="x-none" altLang="en-US" sz="1600">
                 <a:solidFill>
@@ -6119,29 +6175,7 @@
                 <a:latin typeface="Fira Code" panose="020B0609050000020004" charset="0"/>
                 <a:cs typeface="Fira Code" panose="020B0609050000020004" charset="0"/>
               </a:rPr>
-              <a:t> and </a:t>
-            </a:r>
-            <a:r>
-              <a:rPr lang="x-none" altLang="en-US" sz="1600">
-                <a:solidFill>
-                  <a:srgbClr val="92D050"/>
-                </a:solidFill>
-                <a:latin typeface="Fira Code" panose="020B0609050000020004" charset="0"/>
-                <a:cs typeface="Fira Code" panose="020B0609050000020004" charset="0"/>
-              </a:rPr>
-              <a:t>vector</a:t>
-            </a:r>
-            <a:r>
-              <a:rPr lang="x-none" altLang="en-US" sz="1600">
-                <a:solidFill>
-                  <a:schemeClr val="accent6">
-                    <a:lumMod val="75000"/>
-                  </a:schemeClr>
-                </a:solidFill>
-                <a:latin typeface="Fira Code" panose="020B0609050000020004" charset="0"/>
-                <a:cs typeface="Fira Code" panose="020B0609050000020004" charset="0"/>
-              </a:rPr>
-              <a:t> data processing</a:t>
+              <a:t>       &gt;&gt; Be welcoming and respectful  &gt;&gt; Be Kind and considerate to others</a:t>
             </a:r>
             <a:endParaRPr lang="x-none" altLang="en-US" sz="1600">
               <a:solidFill>

</xml_diff>